<commit_message>
Added posterior predictive to graphical abstract
</commit_message>
<xml_diff>
--- a/graphical_abstract.pptx
+++ b/graphical_abstract.pptx
@@ -7,6 +7,7 @@
   <p:sldIdLst>
     <p:sldId id="256" r:id="rId2"/>
     <p:sldId id="257" r:id="rId3"/>
+    <p:sldId id="258" r:id="rId4"/>
   </p:sldIdLst>
   <p:sldSz cx="12192000" cy="6858000"/>
   <p:notesSz cx="6858000" cy="9144000"/>
@@ -260,7 +261,7 @@
           <a:p>
             <a:fld id="{8ACC6A9B-6EB5-43DC-94F0-D0047C8F098E}" type="datetimeFigureOut">
               <a:rPr lang="en-US" smtClean="0"/>
-              <a:t>6/4/2019</a:t>
+              <a:t>2/25/20</a:t>
             </a:fld>
             <a:endParaRPr lang="en-US"/>
           </a:p>
@@ -458,7 +459,7 @@
           <a:p>
             <a:fld id="{8ACC6A9B-6EB5-43DC-94F0-D0047C8F098E}" type="datetimeFigureOut">
               <a:rPr lang="en-US" smtClean="0"/>
-              <a:t>6/4/2019</a:t>
+              <a:t>2/25/20</a:t>
             </a:fld>
             <a:endParaRPr lang="en-US"/>
           </a:p>
@@ -666,7 +667,7 @@
           <a:p>
             <a:fld id="{8ACC6A9B-6EB5-43DC-94F0-D0047C8F098E}" type="datetimeFigureOut">
               <a:rPr lang="en-US" smtClean="0"/>
-              <a:t>6/4/2019</a:t>
+              <a:t>2/25/20</a:t>
             </a:fld>
             <a:endParaRPr lang="en-US"/>
           </a:p>
@@ -864,7 +865,7 @@
           <a:p>
             <a:fld id="{8ACC6A9B-6EB5-43DC-94F0-D0047C8F098E}" type="datetimeFigureOut">
               <a:rPr lang="en-US" smtClean="0"/>
-              <a:t>6/4/2019</a:t>
+              <a:t>2/25/20</a:t>
             </a:fld>
             <a:endParaRPr lang="en-US"/>
           </a:p>
@@ -1139,7 +1140,7 @@
           <a:p>
             <a:fld id="{8ACC6A9B-6EB5-43DC-94F0-D0047C8F098E}" type="datetimeFigureOut">
               <a:rPr lang="en-US" smtClean="0"/>
-              <a:t>6/4/2019</a:t>
+              <a:t>2/25/20</a:t>
             </a:fld>
             <a:endParaRPr lang="en-US"/>
           </a:p>
@@ -1404,7 +1405,7 @@
           <a:p>
             <a:fld id="{8ACC6A9B-6EB5-43DC-94F0-D0047C8F098E}" type="datetimeFigureOut">
               <a:rPr lang="en-US" smtClean="0"/>
-              <a:t>6/4/2019</a:t>
+              <a:t>2/25/20</a:t>
             </a:fld>
             <a:endParaRPr lang="en-US"/>
           </a:p>
@@ -1816,7 +1817,7 @@
           <a:p>
             <a:fld id="{8ACC6A9B-6EB5-43DC-94F0-D0047C8F098E}" type="datetimeFigureOut">
               <a:rPr lang="en-US" smtClean="0"/>
-              <a:t>6/4/2019</a:t>
+              <a:t>2/25/20</a:t>
             </a:fld>
             <a:endParaRPr lang="en-US"/>
           </a:p>
@@ -1957,7 +1958,7 @@
           <a:p>
             <a:fld id="{8ACC6A9B-6EB5-43DC-94F0-D0047C8F098E}" type="datetimeFigureOut">
               <a:rPr lang="en-US" smtClean="0"/>
-              <a:t>6/4/2019</a:t>
+              <a:t>2/25/20</a:t>
             </a:fld>
             <a:endParaRPr lang="en-US"/>
           </a:p>
@@ -2070,7 +2071,7 @@
           <a:p>
             <a:fld id="{8ACC6A9B-6EB5-43DC-94F0-D0047C8F098E}" type="datetimeFigureOut">
               <a:rPr lang="en-US" smtClean="0"/>
-              <a:t>6/4/2019</a:t>
+              <a:t>2/25/20</a:t>
             </a:fld>
             <a:endParaRPr lang="en-US"/>
           </a:p>
@@ -2381,7 +2382,7 @@
           <a:p>
             <a:fld id="{8ACC6A9B-6EB5-43DC-94F0-D0047C8F098E}" type="datetimeFigureOut">
               <a:rPr lang="en-US" smtClean="0"/>
-              <a:t>6/4/2019</a:t>
+              <a:t>2/25/20</a:t>
             </a:fld>
             <a:endParaRPr lang="en-US"/>
           </a:p>
@@ -2669,7 +2670,7 @@
           <a:p>
             <a:fld id="{8ACC6A9B-6EB5-43DC-94F0-D0047C8F098E}" type="datetimeFigureOut">
               <a:rPr lang="en-US" smtClean="0"/>
-              <a:t>6/4/2019</a:t>
+              <a:t>2/25/20</a:t>
             </a:fld>
             <a:endParaRPr lang="en-US"/>
           </a:p>
@@ -2910,7 +2911,7 @@
           <a:p>
             <a:fld id="{8ACC6A9B-6EB5-43DC-94F0-D0047C8F098E}" type="datetimeFigureOut">
               <a:rPr lang="en-US" smtClean="0"/>
-              <a:t>6/4/2019</a:t>
+              <a:t>2/25/20</a:t>
             </a:fld>
             <a:endParaRPr lang="en-US"/>
           </a:p>
@@ -3952,6 +3953,494 @@
 </p:sld>
 </file>
 
+<file path=ppt/slides/slide3.xml><?xml version="1.0" encoding="utf-8"?>
+<p:sld xmlns:a="http://schemas.openxmlformats.org/drawingml/2006/main" xmlns:r="http://schemas.openxmlformats.org/officeDocument/2006/relationships" xmlns:p="http://schemas.openxmlformats.org/presentationml/2006/main">
+  <p:cSld>
+    <p:spTree>
+      <p:nvGrpSpPr>
+        <p:cNvPr id="1" name=""/>
+        <p:cNvGrpSpPr/>
+        <p:nvPr/>
+      </p:nvGrpSpPr>
+      <p:grpSpPr>
+        <a:xfrm>
+          <a:off x="0" y="0"/>
+          <a:ext cx="0" cy="0"/>
+          <a:chOff x="0" y="0"/>
+          <a:chExt cx="0" cy="0"/>
+        </a:xfrm>
+      </p:grpSpPr>
+      <p:pic>
+        <p:nvPicPr>
+          <p:cNvPr id="10" name="Picture 9">
+            <a:extLst>
+              <a:ext uri="{FF2B5EF4-FFF2-40B4-BE49-F238E27FC236}">
+                <a16:creationId xmlns:a16="http://schemas.microsoft.com/office/drawing/2014/main" id="{16200F52-2FB7-4180-9E63-5C7C3646A5C1}"/>
+              </a:ext>
+            </a:extLst>
+          </p:cNvPr>
+          <p:cNvPicPr>
+            <a:picLocks noChangeAspect="1"/>
+          </p:cNvPicPr>
+          <p:nvPr/>
+        </p:nvPicPr>
+        <p:blipFill rotWithShape="1">
+          <a:blip r:embed="rId2"/>
+          <a:srcRect l="51589" t="21236" r="26515" b="45772"/>
+          <a:stretch/>
+        </p:blipFill>
+        <p:spPr>
+          <a:xfrm>
+            <a:off x="339881" y="1564414"/>
+            <a:ext cx="2511813" cy="2128969"/>
+          </a:xfrm>
+          <a:prstGeom prst="rect">
+            <a:avLst/>
+          </a:prstGeom>
+        </p:spPr>
+      </p:pic>
+      <p:sp>
+        <p:nvSpPr>
+          <p:cNvPr id="6" name="TextBox 5">
+            <a:extLst>
+              <a:ext uri="{FF2B5EF4-FFF2-40B4-BE49-F238E27FC236}">
+                <a16:creationId xmlns:a16="http://schemas.microsoft.com/office/drawing/2014/main" id="{A8AB43A5-99D3-4FD4-8C57-481BCE3C36AF}"/>
+              </a:ext>
+            </a:extLst>
+          </p:cNvPr>
+          <p:cNvSpPr txBox="1"/>
+          <p:nvPr/>
+        </p:nvSpPr>
+        <p:spPr>
+          <a:xfrm>
+            <a:off x="564543" y="4497764"/>
+            <a:ext cx="2242268" cy="369332"/>
+          </a:xfrm>
+          <a:prstGeom prst="rect">
+            <a:avLst/>
+          </a:prstGeom>
+          <a:noFill/>
+        </p:spPr>
+        <p:txBody>
+          <a:bodyPr wrap="square" rtlCol="0">
+            <a:spAutoFit/>
+          </a:bodyPr>
+          <a:lstStyle/>
+          <a:p>
+            <a:r>
+              <a:rPr lang="en-US" b="1" dirty="0">
+                <a:latin typeface="Arial" panose="020B0604020202020204" pitchFamily="34" charset="0"/>
+                <a:cs typeface="Arial" panose="020B0604020202020204" pitchFamily="34" charset="0"/>
+              </a:rPr>
+              <a:t>Hospital Database</a:t>
+            </a:r>
+          </a:p>
+        </p:txBody>
+      </p:sp>
+      <p:sp>
+        <p:nvSpPr>
+          <p:cNvPr id="7" name="TextBox 6">
+            <a:extLst>
+              <a:ext uri="{FF2B5EF4-FFF2-40B4-BE49-F238E27FC236}">
+                <a16:creationId xmlns:a16="http://schemas.microsoft.com/office/drawing/2014/main" id="{E6415A3A-64D9-43BC-BE8F-678650673143}"/>
+              </a:ext>
+            </a:extLst>
+          </p:cNvPr>
+          <p:cNvSpPr txBox="1"/>
+          <p:nvPr/>
+        </p:nvSpPr>
+        <p:spPr>
+          <a:xfrm>
+            <a:off x="4684645" y="4497764"/>
+            <a:ext cx="2694165" cy="369332"/>
+          </a:xfrm>
+          <a:prstGeom prst="rect">
+            <a:avLst/>
+          </a:prstGeom>
+          <a:noFill/>
+        </p:spPr>
+        <p:txBody>
+          <a:bodyPr wrap="square" rtlCol="0">
+            <a:spAutoFit/>
+          </a:bodyPr>
+          <a:lstStyle/>
+          <a:p>
+            <a:r>
+              <a:rPr lang="en-US" b="1" dirty="0">
+                <a:latin typeface="Arial" panose="020B0604020202020204" pitchFamily="34" charset="0"/>
+                <a:cs typeface="Arial" panose="020B0604020202020204" pitchFamily="34" charset="0"/>
+              </a:rPr>
+              <a:t>Healthcare Pathway</a:t>
+            </a:r>
+          </a:p>
+        </p:txBody>
+      </p:sp>
+      <p:pic>
+        <p:nvPicPr>
+          <p:cNvPr id="2" name="Picture 1">
+            <a:extLst>
+              <a:ext uri="{FF2B5EF4-FFF2-40B4-BE49-F238E27FC236}">
+                <a16:creationId xmlns:a16="http://schemas.microsoft.com/office/drawing/2014/main" id="{3B74EBAD-344D-46AE-8F31-04D92842253E}"/>
+              </a:ext>
+            </a:extLst>
+          </p:cNvPr>
+          <p:cNvPicPr>
+            <a:picLocks noChangeAspect="1"/>
+          </p:cNvPicPr>
+          <p:nvPr/>
+        </p:nvPicPr>
+        <p:blipFill rotWithShape="1">
+          <a:blip r:embed="rId2"/>
+          <a:srcRect l="51589" t="21236" r="26515" b="45772"/>
+          <a:stretch/>
+        </p:blipFill>
+        <p:spPr>
+          <a:xfrm>
+            <a:off x="709673" y="2150542"/>
+            <a:ext cx="2511812" cy="2128968"/>
+          </a:xfrm>
+          <a:prstGeom prst="rect">
+            <a:avLst/>
+          </a:prstGeom>
+        </p:spPr>
+      </p:pic>
+      <p:grpSp>
+        <p:nvGrpSpPr>
+          <p:cNvPr id="4" name="Group 3">
+            <a:extLst>
+              <a:ext uri="{FF2B5EF4-FFF2-40B4-BE49-F238E27FC236}">
+                <a16:creationId xmlns:a16="http://schemas.microsoft.com/office/drawing/2014/main" id="{D11F9E12-D4FE-497F-AE50-4C6F70BE38BD}"/>
+              </a:ext>
+            </a:extLst>
+          </p:cNvPr>
+          <p:cNvGrpSpPr/>
+          <p:nvPr/>
+        </p:nvGrpSpPr>
+        <p:grpSpPr>
+          <a:xfrm>
+            <a:off x="4429262" y="1659274"/>
+            <a:ext cx="5024228" cy="2633888"/>
+            <a:chOff x="3943846" y="2297928"/>
+            <a:chExt cx="5075516" cy="1910428"/>
+          </a:xfrm>
+        </p:grpSpPr>
+        <p:pic>
+          <p:nvPicPr>
+            <p:cNvPr id="5" name="Picture 4">
+              <a:extLst>
+                <a:ext uri="{FF2B5EF4-FFF2-40B4-BE49-F238E27FC236}">
+                  <a16:creationId xmlns:a16="http://schemas.microsoft.com/office/drawing/2014/main" id="{75955E0B-201D-4F43-BDBA-A0CBAB9F556F}"/>
+                </a:ext>
+              </a:extLst>
+            </p:cNvPr>
+            <p:cNvPicPr>
+              <a:picLocks noChangeAspect="1"/>
+            </p:cNvPicPr>
+            <p:nvPr/>
+          </p:nvPicPr>
+          <p:blipFill rotWithShape="1">
+            <a:blip r:embed="rId3">
+              <a:extLst>
+                <a:ext uri="{28A0092B-C50C-407E-A947-70E740481C1C}">
+                  <a14:useLocalDpi xmlns:a14="http://schemas.microsoft.com/office/drawing/2010/main" val="0"/>
+                </a:ext>
+              </a:extLst>
+            </a:blip>
+            <a:srcRect t="-2229" r="20277"/>
+            <a:stretch/>
+          </p:blipFill>
+          <p:spPr>
+            <a:xfrm>
+              <a:off x="3943846" y="2297928"/>
+              <a:ext cx="5033177" cy="1910428"/>
+            </a:xfrm>
+            <a:prstGeom prst="rect">
+              <a:avLst/>
+            </a:prstGeom>
+          </p:spPr>
+        </p:pic>
+        <p:sp>
+          <p:nvSpPr>
+            <p:cNvPr id="3" name="Rectangle 2">
+              <a:extLst>
+                <a:ext uri="{FF2B5EF4-FFF2-40B4-BE49-F238E27FC236}">
+                  <a16:creationId xmlns:a16="http://schemas.microsoft.com/office/drawing/2014/main" id="{6B5B6124-8C47-4129-97C1-2CF837F453EF}"/>
+                </a:ext>
+              </a:extLst>
+            </p:cNvPr>
+            <p:cNvSpPr/>
+            <p:nvPr/>
+          </p:nvSpPr>
+          <p:spPr>
+            <a:xfrm>
+              <a:off x="8934684" y="3900703"/>
+              <a:ext cx="84678" cy="92665"/>
+            </a:xfrm>
+            <a:prstGeom prst="rect">
+              <a:avLst/>
+            </a:prstGeom>
+            <a:solidFill>
+              <a:schemeClr val="bg1"/>
+            </a:solidFill>
+            <a:ln>
+              <a:solidFill>
+                <a:schemeClr val="bg1"/>
+              </a:solidFill>
+            </a:ln>
+          </p:spPr>
+          <p:style>
+            <a:lnRef idx="2">
+              <a:schemeClr val="accent1">
+                <a:shade val="50000"/>
+              </a:schemeClr>
+            </a:lnRef>
+            <a:fillRef idx="1">
+              <a:schemeClr val="accent1"/>
+            </a:fillRef>
+            <a:effectRef idx="0">
+              <a:schemeClr val="accent1"/>
+            </a:effectRef>
+            <a:fontRef idx="minor">
+              <a:schemeClr val="lt1"/>
+            </a:fontRef>
+          </p:style>
+          <p:txBody>
+            <a:bodyPr rtlCol="0" anchor="ctr"/>
+            <a:lstStyle/>
+            <a:p>
+              <a:pPr algn="ctr"/>
+              <a:endParaRPr lang="en-US"/>
+            </a:p>
+          </p:txBody>
+        </p:sp>
+      </p:grpSp>
+      <p:sp>
+        <p:nvSpPr>
+          <p:cNvPr id="9" name="TextBox 8">
+            <a:extLst>
+              <a:ext uri="{FF2B5EF4-FFF2-40B4-BE49-F238E27FC236}">
+                <a16:creationId xmlns:a16="http://schemas.microsoft.com/office/drawing/2014/main" id="{E81E04BB-4374-4484-BC40-F4C9CA5C2C1B}"/>
+              </a:ext>
+            </a:extLst>
+          </p:cNvPr>
+          <p:cNvSpPr txBox="1"/>
+          <p:nvPr/>
+        </p:nvSpPr>
+        <p:spPr>
+          <a:xfrm>
+            <a:off x="3382239" y="2824566"/>
+            <a:ext cx="1770875" cy="461665"/>
+          </a:xfrm>
+          <a:prstGeom prst="rect">
+            <a:avLst/>
+          </a:prstGeom>
+          <a:noFill/>
+        </p:spPr>
+        <p:txBody>
+          <a:bodyPr wrap="square" rtlCol="0">
+            <a:spAutoFit/>
+          </a:bodyPr>
+          <a:lstStyle/>
+          <a:p>
+            <a:r>
+              <a:rPr lang="en-US" sz="1200" dirty="0">
+                <a:latin typeface="Arial" panose="020B0604020202020204" pitchFamily="34" charset="0"/>
+                <a:cs typeface="Arial" panose="020B0604020202020204" pitchFamily="34" charset="0"/>
+              </a:rPr>
+              <a:t>Business Process Modelling</a:t>
+            </a:r>
+          </a:p>
+        </p:txBody>
+      </p:sp>
+      <p:sp>
+        <p:nvSpPr>
+          <p:cNvPr id="8" name="Arrow: Right 7">
+            <a:extLst>
+              <a:ext uri="{FF2B5EF4-FFF2-40B4-BE49-F238E27FC236}">
+                <a16:creationId xmlns:a16="http://schemas.microsoft.com/office/drawing/2014/main" id="{F5BD109E-B0B4-4B47-90DC-2749B800C407}"/>
+              </a:ext>
+            </a:extLst>
+          </p:cNvPr>
+          <p:cNvSpPr/>
+          <p:nvPr/>
+        </p:nvSpPr>
+        <p:spPr>
+          <a:xfrm>
+            <a:off x="3537160" y="3286231"/>
+            <a:ext cx="1025718" cy="300162"/>
+          </a:xfrm>
+          <a:prstGeom prst="rightArrow">
+            <a:avLst/>
+          </a:prstGeom>
+        </p:spPr>
+        <p:style>
+          <a:lnRef idx="2">
+            <a:schemeClr val="accent1">
+              <a:shade val="50000"/>
+            </a:schemeClr>
+          </a:lnRef>
+          <a:fillRef idx="1">
+            <a:schemeClr val="accent1"/>
+          </a:fillRef>
+          <a:effectRef idx="0">
+            <a:schemeClr val="accent1"/>
+          </a:effectRef>
+          <a:fontRef idx="minor">
+            <a:schemeClr val="lt1"/>
+          </a:fontRef>
+        </p:style>
+        <p:txBody>
+          <a:bodyPr rtlCol="0" anchor="ctr"/>
+          <a:lstStyle/>
+          <a:p>
+            <a:pPr algn="ctr"/>
+            <a:endParaRPr lang="en-US"/>
+          </a:p>
+        </p:txBody>
+      </p:sp>
+      <p:pic>
+        <p:nvPicPr>
+          <p:cNvPr id="12" name="Picture 11">
+            <a:extLst>
+              <a:ext uri="{FF2B5EF4-FFF2-40B4-BE49-F238E27FC236}">
+                <a16:creationId xmlns:a16="http://schemas.microsoft.com/office/drawing/2014/main" id="{755F5FC7-91FE-E740-9077-C68FAA03C09B}"/>
+              </a:ext>
+            </a:extLst>
+          </p:cNvPr>
+          <p:cNvPicPr>
+            <a:picLocks noChangeAspect="1"/>
+          </p:cNvPicPr>
+          <p:nvPr/>
+        </p:nvPicPr>
+        <p:blipFill rotWithShape="1">
+          <a:blip r:embed="rId4">
+            <a:extLst>
+              <a:ext uri="{28A0092B-C50C-407E-A947-70E740481C1C}">
+                <a14:useLocalDpi xmlns:a14="http://schemas.microsoft.com/office/drawing/2010/main" val="0"/>
+              </a:ext>
+            </a:extLst>
+          </a:blip>
+          <a:srcRect l="5751" t="2006"/>
+          <a:stretch/>
+        </p:blipFill>
+        <p:spPr>
+          <a:xfrm>
+            <a:off x="7353005" y="1454672"/>
+            <a:ext cx="2725917" cy="2036861"/>
+          </a:xfrm>
+          <a:prstGeom prst="rect">
+            <a:avLst/>
+          </a:prstGeom>
+        </p:spPr>
+      </p:pic>
+      <p:sp>
+        <p:nvSpPr>
+          <p:cNvPr id="14" name="Bent-Up Arrow 13">
+            <a:extLst>
+              <a:ext uri="{FF2B5EF4-FFF2-40B4-BE49-F238E27FC236}">
+                <a16:creationId xmlns:a16="http://schemas.microsoft.com/office/drawing/2014/main" id="{4CF581F9-713F-D444-8BF7-2AE335C946D7}"/>
+              </a:ext>
+            </a:extLst>
+          </p:cNvPr>
+          <p:cNvSpPr/>
+          <p:nvPr/>
+        </p:nvSpPr>
+        <p:spPr>
+          <a:xfrm>
+            <a:off x="9670635" y="3436312"/>
+            <a:ext cx="633046" cy="668829"/>
+          </a:xfrm>
+          <a:prstGeom prst="bentUpArrow">
+            <a:avLst/>
+          </a:prstGeom>
+        </p:spPr>
+        <p:style>
+          <a:lnRef idx="2">
+            <a:schemeClr val="accent1">
+              <a:shade val="50000"/>
+            </a:schemeClr>
+          </a:lnRef>
+          <a:fillRef idx="1">
+            <a:schemeClr val="accent1"/>
+          </a:fillRef>
+          <a:effectRef idx="0">
+            <a:schemeClr val="accent1"/>
+          </a:effectRef>
+          <a:fontRef idx="minor">
+            <a:schemeClr val="lt1"/>
+          </a:fontRef>
+        </p:style>
+        <p:txBody>
+          <a:bodyPr rtlCol="0" anchor="ctr"/>
+          <a:lstStyle/>
+          <a:p>
+            <a:pPr algn="ctr"/>
+            <a:endParaRPr lang="en-US"/>
+          </a:p>
+        </p:txBody>
+      </p:sp>
+      <p:sp>
+        <p:nvSpPr>
+          <p:cNvPr id="15" name="TextBox 14">
+            <a:extLst>
+              <a:ext uri="{FF2B5EF4-FFF2-40B4-BE49-F238E27FC236}">
+                <a16:creationId xmlns:a16="http://schemas.microsoft.com/office/drawing/2014/main" id="{A432786B-E50F-1B40-BA04-19A42FC8B90A}"/>
+              </a:ext>
+            </a:extLst>
+          </p:cNvPr>
+          <p:cNvSpPr txBox="1"/>
+          <p:nvPr/>
+        </p:nvSpPr>
+        <p:spPr>
+          <a:xfrm>
+            <a:off x="8975390" y="2984193"/>
+            <a:ext cx="1770875" cy="461665"/>
+          </a:xfrm>
+          <a:prstGeom prst="rect">
+            <a:avLst/>
+          </a:prstGeom>
+          <a:solidFill>
+            <a:schemeClr val="bg1"/>
+          </a:solidFill>
+        </p:spPr>
+        <p:txBody>
+          <a:bodyPr wrap="square" rtlCol="0">
+            <a:spAutoFit/>
+          </a:bodyPr>
+          <a:lstStyle/>
+          <a:p>
+            <a:r>
+              <a:rPr lang="en-US" sz="1200" dirty="0">
+                <a:latin typeface="Arial" panose="020B0604020202020204" pitchFamily="34" charset="0"/>
+                <a:cs typeface="Arial" panose="020B0604020202020204" pitchFamily="34" charset="0"/>
+              </a:rPr>
+              <a:t>Probabilistic Machine </a:t>
+            </a:r>
+          </a:p>
+          <a:p>
+            <a:r>
+              <a:rPr lang="en-US" sz="1200" dirty="0">
+                <a:latin typeface="Arial" panose="020B0604020202020204" pitchFamily="34" charset="0"/>
+                <a:cs typeface="Arial" panose="020B0604020202020204" pitchFamily="34" charset="0"/>
+              </a:rPr>
+              <a:t>Learning</a:t>
+            </a:r>
+          </a:p>
+        </p:txBody>
+      </p:sp>
+    </p:spTree>
+    <p:extLst>
+      <p:ext uri="{BB962C8B-B14F-4D97-AF65-F5344CB8AC3E}">
+        <p14:creationId xmlns:p14="http://schemas.microsoft.com/office/powerpoint/2010/main" val="3595972419"/>
+      </p:ext>
+    </p:extLst>
+  </p:cSld>
+  <p:clrMapOvr>
+    <a:masterClrMapping/>
+  </p:clrMapOvr>
+</p:sld>
+</file>
+
 <file path=ppt/theme/theme1.xml><?xml version="1.0" encoding="utf-8"?>
 <a:theme xmlns:a="http://schemas.openxmlformats.org/drawingml/2006/main" name="Office Theme">
   <a:themeElements>

</xml_diff>

<commit_message>
Include probabilistic model into graphical abstract
</commit_message>
<xml_diff>
--- a/graphical_abstract.pptx
+++ b/graphical_abstract.pptx
@@ -4300,10 +4300,10 @@
       </p:sp>
       <p:pic>
         <p:nvPicPr>
-          <p:cNvPr id="12" name="Picture 11">
-            <a:extLst>
-              <a:ext uri="{FF2B5EF4-FFF2-40B4-BE49-F238E27FC236}">
-                <a16:creationId xmlns:a16="http://schemas.microsoft.com/office/drawing/2014/main" id="{755F5FC7-91FE-E740-9077-C68FAA03C09B}"/>
+          <p:cNvPr id="17" name="Picture 16">
+            <a:extLst>
+              <a:ext uri="{FF2B5EF4-FFF2-40B4-BE49-F238E27FC236}">
+                <a16:creationId xmlns:a16="http://schemas.microsoft.com/office/drawing/2014/main" id="{95F26614-4A11-0247-9288-022FB38A4A8B}"/>
               </a:ext>
             </a:extLst>
           </p:cNvPr>
@@ -4320,19 +4320,68 @@
               </a:ext>
             </a:extLst>
           </a:blip>
-          <a:srcRect l="5751" t="2006"/>
+          <a:srcRect l="12293" t="6551" b="13631"/>
           <a:stretch/>
         </p:blipFill>
         <p:spPr>
           <a:xfrm>
-            <a:off x="7353005" y="1454672"/>
-            <a:ext cx="2725917" cy="2036861"/>
+            <a:off x="7288005" y="1667255"/>
+            <a:ext cx="2841508" cy="1865035"/>
           </a:xfrm>
           <a:prstGeom prst="rect">
             <a:avLst/>
           </a:prstGeom>
         </p:spPr>
       </p:pic>
+      <p:sp>
+        <p:nvSpPr>
+          <p:cNvPr id="15" name="TextBox 14">
+            <a:extLst>
+              <a:ext uri="{FF2B5EF4-FFF2-40B4-BE49-F238E27FC236}">
+                <a16:creationId xmlns:a16="http://schemas.microsoft.com/office/drawing/2014/main" id="{A432786B-E50F-1B40-BA04-19A42FC8B90A}"/>
+              </a:ext>
+            </a:extLst>
+          </p:cNvPr>
+          <p:cNvSpPr txBox="1"/>
+          <p:nvPr/>
+        </p:nvSpPr>
+        <p:spPr>
+          <a:xfrm rot="19528139">
+            <a:off x="9101720" y="3033538"/>
+            <a:ext cx="1770875" cy="461665"/>
+          </a:xfrm>
+          <a:prstGeom prst="rect">
+            <a:avLst/>
+          </a:prstGeom>
+          <a:solidFill>
+            <a:schemeClr val="bg1"/>
+          </a:solidFill>
+        </p:spPr>
+        <p:txBody>
+          <a:bodyPr wrap="square" rtlCol="0">
+            <a:spAutoFit/>
+          </a:bodyPr>
+          <a:lstStyle/>
+          <a:p>
+            <a:r>
+              <a:rPr lang="en-US" sz="1200" dirty="0">
+                <a:latin typeface="Arial" panose="020B0604020202020204" pitchFamily="34" charset="0"/>
+                <a:cs typeface="Arial" panose="020B0604020202020204" pitchFamily="34" charset="0"/>
+              </a:rPr>
+              <a:t>Probabilistic Machine </a:t>
+            </a:r>
+          </a:p>
+          <a:p>
+            <a:r>
+              <a:rPr lang="en-US" sz="1200" dirty="0">
+                <a:latin typeface="Arial" panose="020B0604020202020204" pitchFamily="34" charset="0"/>
+                <a:cs typeface="Arial" panose="020B0604020202020204" pitchFamily="34" charset="0"/>
+              </a:rPr>
+              <a:t>Learning</a:t>
+            </a:r>
+          </a:p>
+        </p:txBody>
+      </p:sp>
       <p:sp>
         <p:nvSpPr>
           <p:cNvPr id="14" name="Bent-Up Arrow 13">
@@ -4381,10 +4430,10 @@
       </p:sp>
       <p:sp>
         <p:nvSpPr>
-          <p:cNvPr id="15" name="TextBox 14">
-            <a:extLst>
-              <a:ext uri="{FF2B5EF4-FFF2-40B4-BE49-F238E27FC236}">
-                <a16:creationId xmlns:a16="http://schemas.microsoft.com/office/drawing/2014/main" id="{A432786B-E50F-1B40-BA04-19A42FC8B90A}"/>
+          <p:cNvPr id="18" name="TextBox 17">
+            <a:extLst>
+              <a:ext uri="{FF2B5EF4-FFF2-40B4-BE49-F238E27FC236}">
+                <a16:creationId xmlns:a16="http://schemas.microsoft.com/office/drawing/2014/main" id="{871D0902-81D5-0148-8120-4A437B591CD7}"/>
               </a:ext>
             </a:extLst>
           </p:cNvPr>
@@ -4393,15 +4442,13 @@
         </p:nvSpPr>
         <p:spPr>
           <a:xfrm>
-            <a:off x="8975390" y="2984193"/>
-            <a:ext cx="1770875" cy="461665"/>
+            <a:off x="8481604" y="1564414"/>
+            <a:ext cx="2694165" cy="369332"/>
           </a:xfrm>
           <a:prstGeom prst="rect">
             <a:avLst/>
           </a:prstGeom>
-          <a:solidFill>
-            <a:schemeClr val="bg1"/>
-          </a:solidFill>
+          <a:noFill/>
         </p:spPr>
         <p:txBody>
           <a:bodyPr wrap="square" rtlCol="0">
@@ -4410,20 +4457,11 @@
           <a:lstStyle/>
           <a:p>
             <a:r>
-              <a:rPr lang="en-US" sz="1200" dirty="0">
+              <a:rPr lang="en-US" b="1" dirty="0">
                 <a:latin typeface="Arial" panose="020B0604020202020204" pitchFamily="34" charset="0"/>
                 <a:cs typeface="Arial" panose="020B0604020202020204" pitchFamily="34" charset="0"/>
               </a:rPr>
-              <a:t>Probabilistic Machine </a:t>
-            </a:r>
-          </a:p>
-          <a:p>
-            <a:r>
-              <a:rPr lang="en-US" sz="1200" dirty="0">
-                <a:latin typeface="Arial" panose="020B0604020202020204" pitchFamily="34" charset="0"/>
-                <a:cs typeface="Arial" panose="020B0604020202020204" pitchFamily="34" charset="0"/>
-              </a:rPr>
-              <a:t>Learning</a:t>
+              <a:t>Predictive Model</a:t>
             </a:r>
           </a:p>
         </p:txBody>

</xml_diff>